<commit_message>
changed presentations a little
</commit_message>
<xml_diff>
--- a/Week10/presentation/Rombertik/Don’t mess with the Rombertik.pptx
+++ b/Week10/presentation/Rombertik/Don’t mess with the Rombertik.pptx
@@ -6,10 +6,10 @@
   </p:sldMasterIdLst>
   <p:sldIdLst>
     <p:sldId id="256" r:id="rId2"/>
-    <p:sldId id="267" r:id="rId3"/>
-    <p:sldId id="265" r:id="rId4"/>
-    <p:sldId id="258" r:id="rId5"/>
-    <p:sldId id="259" r:id="rId6"/>
+    <p:sldId id="259" r:id="rId3"/>
+    <p:sldId id="267" r:id="rId4"/>
+    <p:sldId id="265" r:id="rId5"/>
+    <p:sldId id="258" r:id="rId6"/>
     <p:sldId id="260" r:id="rId7"/>
     <p:sldId id="272" r:id="rId8"/>
     <p:sldId id="268" r:id="rId9"/>
@@ -17,8 +17,8 @@
     <p:sldId id="257" r:id="rId11"/>
     <p:sldId id="262" r:id="rId12"/>
     <p:sldId id="263" r:id="rId13"/>
-    <p:sldId id="270" r:id="rId14"/>
-    <p:sldId id="271" r:id="rId15"/>
+    <p:sldId id="271" r:id="rId14"/>
+    <p:sldId id="270" r:id="rId15"/>
   </p:sldIdLst>
   <p:sldSz cx="12192000" cy="6858000"/>
   <p:notesSz cx="6858000" cy="9144000"/>
@@ -123,6 +123,32 @@
     </p:ext>
   </p:extLst>
 </p:presentation>
+</file>
+
+<file path=ppt/commentAuthors.xml><?xml version="1.0" encoding="utf-8"?>
+<p:cmAuthorLst xmlns:a="http://schemas.openxmlformats.org/drawingml/2006/main" xmlns:r="http://schemas.openxmlformats.org/officeDocument/2006/relationships" xmlns:p="http://schemas.openxmlformats.org/presentationml/2006/main">
+  <p:cmAuthor id="1" name="Almania" initials="A" lastIdx="1" clrIdx="0">
+    <p:extLst>
+      <p:ext uri="{19B8F6BF-5375-455C-9EA6-DF929625EA0E}">
+        <p15:presenceInfo xmlns:p15="http://schemas.microsoft.com/office/powerpoint/2012/main" userId="Almania" providerId="None"/>
+      </p:ext>
+    </p:extLst>
+  </p:cmAuthor>
+</p:cmAuthorLst>
+</file>
+
+<file path=ppt/comments/comment1.xml><?xml version="1.0" encoding="utf-8"?>
+<p:cmLst xmlns:a="http://schemas.openxmlformats.org/drawingml/2006/main" xmlns:r="http://schemas.openxmlformats.org/officeDocument/2006/relationships" xmlns:p="http://schemas.openxmlformats.org/presentationml/2006/main">
+  <p:cm authorId="1" dt="2017-11-29T23:02:34.925" idx="1">
+    <p:pos x="10" y="10"/>
+    <p:text/>
+    <p:extLst>
+      <p:ext uri="{C676402C-5697-4E1C-873F-D02D1690AC5C}">
+        <p15:threadingInfo xmlns:p15="http://schemas.microsoft.com/office/powerpoint/2012/main" timeZoneBias="480"/>
+      </p:ext>
+    </p:extLst>
+  </p:cm>
+</p:cmLst>
 </file>
 
 <file path=ppt/slideLayouts/slideLayout1.xml><?xml version="1.0" encoding="utf-8"?>
@@ -847,7 +873,7 @@
           <a:p>
             <a:fld id="{4C64E65D-34AD-4F5A-BDBF-DC4C4AD4A363}" type="datetimeFigureOut">
               <a:rPr lang="en-US" smtClean="0"/>
-              <a:t>11/27/2017</a:t>
+              <a:t>11/29/2017</a:t>
             </a:fld>
             <a:endParaRPr lang="en-US"/>
           </a:p>
@@ -1098,7 +1124,7 @@
           <a:p>
             <a:fld id="{4C64E65D-34AD-4F5A-BDBF-DC4C4AD4A363}" type="datetimeFigureOut">
               <a:rPr lang="en-US" smtClean="0"/>
-              <a:t>11/27/2017</a:t>
+              <a:t>11/29/2017</a:t>
             </a:fld>
             <a:endParaRPr lang="en-US"/>
           </a:p>
@@ -1412,7 +1438,7 @@
           <a:p>
             <a:fld id="{4C64E65D-34AD-4F5A-BDBF-DC4C4AD4A363}" type="datetimeFigureOut">
               <a:rPr lang="en-US" smtClean="0"/>
-              <a:t>11/27/2017</a:t>
+              <a:t>11/29/2017</a:t>
             </a:fld>
             <a:endParaRPr lang="en-US"/>
           </a:p>
@@ -1753,7 +1779,7 @@
           <a:p>
             <a:fld id="{4C64E65D-34AD-4F5A-BDBF-DC4C4AD4A363}" type="datetimeFigureOut">
               <a:rPr lang="en-US" smtClean="0"/>
-              <a:t>11/27/2017</a:t>
+              <a:t>11/29/2017</a:t>
             </a:fld>
             <a:endParaRPr lang="en-US"/>
           </a:p>
@@ -2067,7 +2093,7 @@
           <a:p>
             <a:fld id="{4C64E65D-34AD-4F5A-BDBF-DC4C4AD4A363}" type="datetimeFigureOut">
               <a:rPr lang="en-US" smtClean="0"/>
-              <a:t>11/27/2017</a:t>
+              <a:t>11/29/2017</a:t>
             </a:fld>
             <a:endParaRPr lang="en-US"/>
           </a:p>
@@ -2460,7 +2486,7 @@
           <a:p>
             <a:fld id="{4C64E65D-34AD-4F5A-BDBF-DC4C4AD4A363}" type="datetimeFigureOut">
               <a:rPr lang="en-US" smtClean="0"/>
-              <a:t>11/27/2017</a:t>
+              <a:t>11/29/2017</a:t>
             </a:fld>
             <a:endParaRPr lang="en-US"/>
           </a:p>
@@ -2630,7 +2656,7 @@
           <a:p>
             <a:fld id="{4C64E65D-34AD-4F5A-BDBF-DC4C4AD4A363}" type="datetimeFigureOut">
               <a:rPr lang="en-US" smtClean="0"/>
-              <a:t>11/27/2017</a:t>
+              <a:t>11/29/2017</a:t>
             </a:fld>
             <a:endParaRPr lang="en-US"/>
           </a:p>
@@ -2810,7 +2836,7 @@
           <a:p>
             <a:fld id="{4C64E65D-34AD-4F5A-BDBF-DC4C4AD4A363}" type="datetimeFigureOut">
               <a:rPr lang="en-US" smtClean="0"/>
-              <a:t>11/27/2017</a:t>
+              <a:t>11/29/2017</a:t>
             </a:fld>
             <a:endParaRPr lang="en-US"/>
           </a:p>
@@ -2986,7 +3012,7 @@
           <a:p>
             <a:fld id="{4C64E65D-34AD-4F5A-BDBF-DC4C4AD4A363}" type="datetimeFigureOut">
               <a:rPr lang="en-US" smtClean="0"/>
-              <a:t>11/27/2017</a:t>
+              <a:t>11/29/2017</a:t>
             </a:fld>
             <a:endParaRPr lang="en-US"/>
           </a:p>
@@ -3233,7 +3259,7 @@
           <a:p>
             <a:fld id="{4C64E65D-34AD-4F5A-BDBF-DC4C4AD4A363}" type="datetimeFigureOut">
               <a:rPr lang="en-US" smtClean="0"/>
-              <a:t>11/27/2017</a:t>
+              <a:t>11/29/2017</a:t>
             </a:fld>
             <a:endParaRPr lang="en-US"/>
           </a:p>
@@ -3465,7 +3491,7 @@
           <a:p>
             <a:fld id="{4C64E65D-34AD-4F5A-BDBF-DC4C4AD4A363}" type="datetimeFigureOut">
               <a:rPr lang="en-US" smtClean="0"/>
-              <a:t>11/27/2017</a:t>
+              <a:t>11/29/2017</a:t>
             </a:fld>
             <a:endParaRPr lang="en-US"/>
           </a:p>
@@ -3839,7 +3865,7 @@
           <a:p>
             <a:fld id="{4C64E65D-34AD-4F5A-BDBF-DC4C4AD4A363}" type="datetimeFigureOut">
               <a:rPr lang="en-US" smtClean="0"/>
-              <a:t>11/27/2017</a:t>
+              <a:t>11/29/2017</a:t>
             </a:fld>
             <a:endParaRPr lang="en-US"/>
           </a:p>
@@ -3962,7 +3988,7 @@
           <a:p>
             <a:fld id="{4C64E65D-34AD-4F5A-BDBF-DC4C4AD4A363}" type="datetimeFigureOut">
               <a:rPr lang="en-US" smtClean="0"/>
-              <a:t>11/27/2017</a:t>
+              <a:t>11/29/2017</a:t>
             </a:fld>
             <a:endParaRPr lang="en-US"/>
           </a:p>
@@ -4057,7 +4083,7 @@
           <a:p>
             <a:fld id="{4C64E65D-34AD-4F5A-BDBF-DC4C4AD4A363}" type="datetimeFigureOut">
               <a:rPr lang="en-US" smtClean="0"/>
-              <a:t>11/27/2017</a:t>
+              <a:t>11/29/2017</a:t>
             </a:fld>
             <a:endParaRPr lang="en-US"/>
           </a:p>
@@ -4312,7 +4338,7 @@
           <a:p>
             <a:fld id="{4C64E65D-34AD-4F5A-BDBF-DC4C4AD4A363}" type="datetimeFigureOut">
               <a:rPr lang="en-US" smtClean="0"/>
-              <a:t>11/27/2017</a:t>
+              <a:t>11/29/2017</a:t>
             </a:fld>
             <a:endParaRPr lang="en-US"/>
           </a:p>
@@ -4575,7 +4601,7 @@
           <a:p>
             <a:fld id="{4C64E65D-34AD-4F5A-BDBF-DC4C4AD4A363}" type="datetimeFigureOut">
               <a:rPr lang="en-US" smtClean="0"/>
-              <a:t>11/27/2017</a:t>
+              <a:t>11/29/2017</a:t>
             </a:fld>
             <a:endParaRPr lang="en-US"/>
           </a:p>
@@ -5318,7 +5344,7 @@
           <a:p>
             <a:fld id="{4C64E65D-34AD-4F5A-BDBF-DC4C4AD4A363}" type="datetimeFigureOut">
               <a:rPr lang="en-US" smtClean="0"/>
-              <a:t>11/27/2017</a:t>
+              <a:t>11/29/2017</a:t>
             </a:fld>
             <a:endParaRPr lang="en-US"/>
           </a:p>
@@ -6409,44 +6435,6 @@
           <a:chExt cx="0" cy="0"/>
         </a:xfrm>
       </p:grpSpPr>
-      <p:sp>
-        <p:nvSpPr>
-          <p:cNvPr id="2" name="Title 1"/>
-          <p:cNvSpPr>
-            <a:spLocks noGrp="1"/>
-          </p:cNvSpPr>
-          <p:nvPr>
-            <p:ph type="title"/>
-          </p:nvPr>
-        </p:nvSpPr>
-        <p:spPr>
-          <a:xfrm>
-            <a:off x="677333" y="288285"/>
-            <a:ext cx="5370175" cy="553379"/>
-          </a:xfrm>
-        </p:spPr>
-        <p:txBody>
-          <a:bodyPr>
-            <a:normAutofit fontScale="90000"/>
-          </a:bodyPr>
-          <a:lstStyle/>
-          <a:p>
-            <a:r>
-              <a:rPr lang="en-US" sz="3200" dirty="0" smtClean="0"/>
-              <a:t>What </a:t>
-            </a:r>
-            <a:r>
-              <a:rPr lang="en-US" sz="3200" dirty="0" err="1" smtClean="0"/>
-              <a:t>Rombertik</a:t>
-            </a:r>
-            <a:r>
-              <a:rPr lang="en-US" sz="3200" dirty="0" smtClean="0"/>
-              <a:t> really is</a:t>
-            </a:r>
-            <a:endParaRPr lang="en-US" sz="3200" dirty="0"/>
-          </a:p>
-        </p:txBody>
-      </p:sp>
       <p:pic>
         <p:nvPicPr>
           <p:cNvPr id="5" name="Content Placeholder 4"/>
@@ -6471,8 +6459,8 @@
         </p:blipFill>
         <p:spPr>
           <a:xfrm>
-            <a:off x="4864371" y="927519"/>
-            <a:ext cx="5204420" cy="4963936"/>
+            <a:off x="955435" y="1029811"/>
+            <a:ext cx="7957511" cy="5363518"/>
           </a:xfrm>
         </p:spPr>
       </p:pic>
@@ -6488,91 +6476,28 @@
         </p:nvSpPr>
         <p:spPr>
           <a:xfrm>
-            <a:off x="677334" y="927519"/>
-            <a:ext cx="3854528" cy="4434000"/>
+            <a:off x="503430" y="403715"/>
+            <a:ext cx="8861520" cy="626096"/>
           </a:xfrm>
         </p:spPr>
         <p:txBody>
           <a:bodyPr>
-            <a:normAutofit fontScale="92500"/>
+            <a:noAutofit/>
           </a:bodyPr>
           <a:lstStyle/>
           <a:p>
-            <a:pPr marL="285750" indent="-285750">
-              <a:lnSpc>
-                <a:spcPct val="150000"/>
-              </a:lnSpc>
-              <a:buFont typeface="Arial" panose="020B0604020202020204" pitchFamily="34" charset="0"/>
-              <a:buChar char="•"/>
-            </a:pPr>
             <a:r>
               <a:rPr lang="en-US" sz="1800" dirty="0" smtClean="0"/>
-              <a:t>Modified version of </a:t>
-            </a:r>
-            <a:r>
-              <a:rPr lang="en-US" sz="1800" dirty="0" err="1" smtClean="0"/>
-              <a:t>FormGrabber</a:t>
-            </a:r>
-            <a:endParaRPr lang="en-US" sz="1800" dirty="0" smtClean="0"/>
-          </a:p>
-          <a:p>
-            <a:pPr marL="285750" indent="-285750">
-              <a:lnSpc>
-                <a:spcPct val="150000"/>
-              </a:lnSpc>
-              <a:buFont typeface="Arial" panose="020B0604020202020204" pitchFamily="34" charset="0"/>
-              <a:buChar char="•"/>
-            </a:pPr>
-            <a:r>
-              <a:rPr lang="en-US" sz="1800" dirty="0" smtClean="0"/>
-              <a:t>Made by commercial criminal enterprise</a:t>
-            </a:r>
-          </a:p>
-          <a:p>
-            <a:pPr marL="285750" indent="-285750">
-              <a:lnSpc>
-                <a:spcPct val="150000"/>
-              </a:lnSpc>
-              <a:buFont typeface="Arial" panose="020B0604020202020204" pitchFamily="34" charset="0"/>
-              <a:buChar char="•"/>
-            </a:pPr>
-            <a:r>
-              <a:rPr lang="en-US" sz="1800" dirty="0" smtClean="0"/>
-              <a:t>Made for looser cybercriminals who don’t know how to program</a:t>
-            </a:r>
-          </a:p>
-          <a:p>
-            <a:pPr marL="285750" indent="-285750">
-              <a:lnSpc>
-                <a:spcPct val="150000"/>
-              </a:lnSpc>
-              <a:buFont typeface="Arial" panose="020B0604020202020204" pitchFamily="34" charset="0"/>
-              <a:buChar char="•"/>
-            </a:pPr>
-            <a:r>
-              <a:rPr lang="en-US" sz="1800" dirty="0" smtClean="0"/>
-              <a:t>Developed specific to each client Command &amp; Control server</a:t>
-            </a:r>
-          </a:p>
-          <a:p>
-            <a:pPr marL="285750" indent="-285750">
-              <a:lnSpc>
-                <a:spcPct val="150000"/>
-              </a:lnSpc>
-              <a:buFont typeface="Arial" panose="020B0604020202020204" pitchFamily="34" charset="0"/>
-              <a:buChar char="•"/>
-            </a:pPr>
-            <a:r>
-              <a:rPr lang="en-US" sz="1800" dirty="0" smtClean="0"/>
-              <a:t>Destructive mechanism originally made for anti-piracy</a:t>
-            </a:r>
+              <a:t>Attempting hackers receive this message when they fail to change the C&amp;C address</a:t>
+            </a:r>
+            <a:endParaRPr lang="en-US" sz="1800" dirty="0"/>
           </a:p>
         </p:txBody>
       </p:sp>
     </p:spTree>
     <p:extLst>
       <p:ext uri="{BB962C8B-B14F-4D97-AF65-F5344CB8AC3E}">
-        <p14:creationId xmlns:p14="http://schemas.microsoft.com/office/powerpoint/2010/main" val="1833765103"/>
+        <p14:creationId xmlns:p14="http://schemas.microsoft.com/office/powerpoint/2010/main" val="2716429327"/>
       </p:ext>
     </p:extLst>
   </p:cSld>
@@ -6599,6 +6524,44 @@
           <a:chExt cx="0" cy="0"/>
         </a:xfrm>
       </p:grpSpPr>
+      <p:sp>
+        <p:nvSpPr>
+          <p:cNvPr id="2" name="Title 1"/>
+          <p:cNvSpPr>
+            <a:spLocks noGrp="1"/>
+          </p:cNvSpPr>
+          <p:nvPr>
+            <p:ph type="title"/>
+          </p:nvPr>
+        </p:nvSpPr>
+        <p:spPr>
+          <a:xfrm>
+            <a:off x="677333" y="288285"/>
+            <a:ext cx="5370175" cy="553379"/>
+          </a:xfrm>
+        </p:spPr>
+        <p:txBody>
+          <a:bodyPr>
+            <a:normAutofit fontScale="90000"/>
+          </a:bodyPr>
+          <a:lstStyle/>
+          <a:p>
+            <a:r>
+              <a:rPr lang="en-US" sz="3200" dirty="0" smtClean="0"/>
+              <a:t>What </a:t>
+            </a:r>
+            <a:r>
+              <a:rPr lang="en-US" sz="3200" dirty="0" err="1" smtClean="0"/>
+              <a:t>Rombertik</a:t>
+            </a:r>
+            <a:r>
+              <a:rPr lang="en-US" sz="3200" dirty="0" smtClean="0"/>
+              <a:t> really is</a:t>
+            </a:r>
+            <a:endParaRPr lang="en-US" sz="3200" dirty="0"/>
+          </a:p>
+        </p:txBody>
+      </p:sp>
       <p:pic>
         <p:nvPicPr>
           <p:cNvPr id="5" name="Content Placeholder 4"/>
@@ -6623,8 +6586,8 @@
         </p:blipFill>
         <p:spPr>
           <a:xfrm>
-            <a:off x="955435" y="1029811"/>
-            <a:ext cx="7957511" cy="5363518"/>
+            <a:off x="4864371" y="927519"/>
+            <a:ext cx="5204420" cy="4963936"/>
           </a:xfrm>
         </p:spPr>
       </p:pic>
@@ -6640,28 +6603,91 @@
         </p:nvSpPr>
         <p:spPr>
           <a:xfrm>
-            <a:off x="503430" y="403715"/>
-            <a:ext cx="8861520" cy="626096"/>
+            <a:off x="677334" y="927519"/>
+            <a:ext cx="3854528" cy="4434000"/>
           </a:xfrm>
         </p:spPr>
         <p:txBody>
           <a:bodyPr>
-            <a:noAutofit/>
+            <a:normAutofit fontScale="92500"/>
           </a:bodyPr>
           <a:lstStyle/>
           <a:p>
+            <a:pPr marL="285750" indent="-285750">
+              <a:lnSpc>
+                <a:spcPct val="150000"/>
+              </a:lnSpc>
+              <a:buFont typeface="Arial" panose="020B0604020202020204" pitchFamily="34" charset="0"/>
+              <a:buChar char="•"/>
+            </a:pPr>
             <a:r>
               <a:rPr lang="en-US" sz="1800" dirty="0" smtClean="0"/>
-              <a:t>Attempting hackers receive this message when they fail to change the C&amp;C address</a:t>
-            </a:r>
-            <a:endParaRPr lang="en-US" sz="1800" dirty="0"/>
+              <a:t>Modified version of </a:t>
+            </a:r>
+            <a:r>
+              <a:rPr lang="en-US" sz="1800" dirty="0" err="1" smtClean="0"/>
+              <a:t>FormGrabber</a:t>
+            </a:r>
+            <a:endParaRPr lang="en-US" sz="1800" dirty="0" smtClean="0"/>
+          </a:p>
+          <a:p>
+            <a:pPr marL="285750" indent="-285750">
+              <a:lnSpc>
+                <a:spcPct val="150000"/>
+              </a:lnSpc>
+              <a:buFont typeface="Arial" panose="020B0604020202020204" pitchFamily="34" charset="0"/>
+              <a:buChar char="•"/>
+            </a:pPr>
+            <a:r>
+              <a:rPr lang="en-US" sz="1800" dirty="0" smtClean="0"/>
+              <a:t>Made by commercial criminal enterprise</a:t>
+            </a:r>
+          </a:p>
+          <a:p>
+            <a:pPr marL="285750" indent="-285750">
+              <a:lnSpc>
+                <a:spcPct val="150000"/>
+              </a:lnSpc>
+              <a:buFont typeface="Arial" panose="020B0604020202020204" pitchFamily="34" charset="0"/>
+              <a:buChar char="•"/>
+            </a:pPr>
+            <a:r>
+              <a:rPr lang="en-US" sz="1800" dirty="0" smtClean="0"/>
+              <a:t>Made for looser cybercriminals who don’t know how to program</a:t>
+            </a:r>
+          </a:p>
+          <a:p>
+            <a:pPr marL="285750" indent="-285750">
+              <a:lnSpc>
+                <a:spcPct val="150000"/>
+              </a:lnSpc>
+              <a:buFont typeface="Arial" panose="020B0604020202020204" pitchFamily="34" charset="0"/>
+              <a:buChar char="•"/>
+            </a:pPr>
+            <a:r>
+              <a:rPr lang="en-US" sz="1800" dirty="0" smtClean="0"/>
+              <a:t>Developed specific to each client Command &amp; Control server</a:t>
+            </a:r>
+          </a:p>
+          <a:p>
+            <a:pPr marL="285750" indent="-285750">
+              <a:lnSpc>
+                <a:spcPct val="150000"/>
+              </a:lnSpc>
+              <a:buFont typeface="Arial" panose="020B0604020202020204" pitchFamily="34" charset="0"/>
+              <a:buChar char="•"/>
+            </a:pPr>
+            <a:r>
+              <a:rPr lang="en-US" sz="1800" dirty="0" smtClean="0"/>
+              <a:t>Destructive mechanism originally made for anti-piracy</a:t>
+            </a:r>
           </a:p>
         </p:txBody>
       </p:sp>
     </p:spTree>
     <p:extLst>
       <p:ext uri="{BB962C8B-B14F-4D97-AF65-F5344CB8AC3E}">
-        <p14:creationId xmlns:p14="http://schemas.microsoft.com/office/powerpoint/2010/main" val="2716429327"/>
+        <p14:creationId xmlns:p14="http://schemas.microsoft.com/office/powerpoint/2010/main" val="1833765103"/>
       </p:ext>
     </p:extLst>
   </p:cSld>
@@ -6672,6 +6698,174 @@
 </file>
 
 <file path=ppt/slides/slide2.xml><?xml version="1.0" encoding="utf-8"?>
+<p:sld xmlns:a="http://schemas.openxmlformats.org/drawingml/2006/main" xmlns:r="http://schemas.openxmlformats.org/officeDocument/2006/relationships" xmlns:p="http://schemas.openxmlformats.org/presentationml/2006/main">
+  <p:cSld>
+    <p:spTree>
+      <p:nvGrpSpPr>
+        <p:cNvPr id="1" name=""/>
+        <p:cNvGrpSpPr/>
+        <p:nvPr/>
+      </p:nvGrpSpPr>
+      <p:grpSpPr>
+        <a:xfrm>
+          <a:off x="0" y="0"/>
+          <a:ext cx="0" cy="0"/>
+          <a:chOff x="0" y="0"/>
+          <a:chExt cx="0" cy="0"/>
+        </a:xfrm>
+      </p:grpSpPr>
+      <p:sp>
+        <p:nvSpPr>
+          <p:cNvPr id="2" name="Title 1"/>
+          <p:cNvSpPr>
+            <a:spLocks noGrp="1"/>
+          </p:cNvSpPr>
+          <p:nvPr>
+            <p:ph type="title"/>
+          </p:nvPr>
+        </p:nvSpPr>
+        <p:spPr>
+          <a:xfrm>
+            <a:off x="677334" y="337819"/>
+            <a:ext cx="5015012" cy="659710"/>
+          </a:xfrm>
+        </p:spPr>
+        <p:txBody>
+          <a:bodyPr>
+            <a:normAutofit/>
+          </a:bodyPr>
+          <a:lstStyle/>
+          <a:p>
+            <a:r>
+              <a:rPr lang="en-US" sz="3200" dirty="0" smtClean="0">
+                <a:solidFill>
+                  <a:schemeClr val="accent2">
+                    <a:lumMod val="75000"/>
+                  </a:schemeClr>
+                </a:solidFill>
+              </a:rPr>
+              <a:t>How do you get infected?</a:t>
+            </a:r>
+            <a:endParaRPr lang="en-US" sz="3200" dirty="0">
+              <a:solidFill>
+                <a:schemeClr val="accent2">
+                  <a:lumMod val="75000"/>
+                </a:schemeClr>
+              </a:solidFill>
+            </a:endParaRPr>
+          </a:p>
+        </p:txBody>
+      </p:sp>
+      <p:sp>
+        <p:nvSpPr>
+          <p:cNvPr id="4" name="Text Placeholder 3"/>
+          <p:cNvSpPr>
+            <a:spLocks noGrp="1"/>
+          </p:cNvSpPr>
+          <p:nvPr>
+            <p:ph type="body" sz="half" idx="2"/>
+          </p:nvPr>
+        </p:nvSpPr>
+        <p:spPr>
+          <a:xfrm>
+            <a:off x="677334" y="1138266"/>
+            <a:ext cx="5910502" cy="1703647"/>
+          </a:xfrm>
+        </p:spPr>
+        <p:txBody>
+          <a:bodyPr>
+            <a:normAutofit/>
+          </a:bodyPr>
+          <a:lstStyle/>
+          <a:p>
+            <a:r>
+              <a:rPr lang="en-US" sz="2400" b="1" dirty="0" smtClean="0">
+                <a:solidFill>
+                  <a:schemeClr val="accent2">
+                    <a:lumMod val="75000"/>
+                  </a:schemeClr>
+                </a:solidFill>
+              </a:rPr>
+              <a:t>Phishing</a:t>
+            </a:r>
+          </a:p>
+          <a:p>
+            <a:pPr marL="285750" indent="-285750">
+              <a:buFont typeface="Arial" panose="020B0604020202020204" pitchFamily="34" charset="0"/>
+              <a:buChar char="•"/>
+            </a:pPr>
+            <a:r>
+              <a:rPr lang="en-US" sz="1800" dirty="0" smtClean="0"/>
+              <a:t>Attracts targets through email propositions</a:t>
+            </a:r>
+          </a:p>
+          <a:p>
+            <a:pPr marL="285750" indent="-285750">
+              <a:buFont typeface="Arial" panose="020B0604020202020204" pitchFamily="34" charset="0"/>
+              <a:buChar char="•"/>
+            </a:pPr>
+            <a:r>
+              <a:rPr lang="en-US" sz="1800" dirty="0" smtClean="0"/>
+              <a:t>Program disguised as document but really is a .SCR </a:t>
+            </a:r>
+          </a:p>
+          <a:p>
+            <a:pPr marL="285750" indent="-285750">
+              <a:buFont typeface="Arial" panose="020B0604020202020204" pitchFamily="34" charset="0"/>
+              <a:buChar char="•"/>
+            </a:pPr>
+            <a:r>
+              <a:rPr lang="en-US" sz="1800" dirty="0" smtClean="0"/>
+              <a:t>Compromises data after launching it</a:t>
+            </a:r>
+            <a:endParaRPr lang="en-US" sz="1800" dirty="0"/>
+          </a:p>
+        </p:txBody>
+      </p:sp>
+      <p:pic>
+        <p:nvPicPr>
+          <p:cNvPr id="6" name="Picture 5"/>
+          <p:cNvPicPr>
+            <a:picLocks noChangeAspect="1"/>
+          </p:cNvPicPr>
+          <p:nvPr/>
+        </p:nvPicPr>
+        <p:blipFill>
+          <a:blip r:embed="rId2" cstate="print">
+            <a:extLst>
+              <a:ext uri="{28A0092B-C50C-407E-A947-70E740481C1C}">
+                <a14:useLocalDpi xmlns:a14="http://schemas.microsoft.com/office/drawing/2010/main" val="0"/>
+              </a:ext>
+            </a:extLst>
+          </a:blip>
+          <a:stretch>
+            <a:fillRect/>
+          </a:stretch>
+        </p:blipFill>
+        <p:spPr>
+          <a:xfrm>
+            <a:off x="2493818" y="2982651"/>
+            <a:ext cx="5359643" cy="3761048"/>
+          </a:xfrm>
+          <a:prstGeom prst="rect">
+            <a:avLst/>
+          </a:prstGeom>
+        </p:spPr>
+      </p:pic>
+    </p:spTree>
+    <p:extLst>
+      <p:ext uri="{BB962C8B-B14F-4D97-AF65-F5344CB8AC3E}">
+        <p14:creationId xmlns:p14="http://schemas.microsoft.com/office/powerpoint/2010/main" val="1825227377"/>
+      </p:ext>
+    </p:extLst>
+  </p:cSld>
+  <p:clrMapOvr>
+    <a:masterClrMapping/>
+  </p:clrMapOvr>
+</p:sld>
+</file>
+
+<file path=ppt/slides/slide3.xml><?xml version="1.0" encoding="utf-8"?>
 <p:sld xmlns:a="http://schemas.openxmlformats.org/drawingml/2006/main" xmlns:r="http://schemas.openxmlformats.org/officeDocument/2006/relationships" xmlns:p="http://schemas.openxmlformats.org/presentationml/2006/main">
   <p:cSld>
     <p:spTree>
@@ -6773,7 +6967,7 @@
 </p:sld>
 </file>
 
-<file path=ppt/slides/slide3.xml><?xml version="1.0" encoding="utf-8"?>
+<file path=ppt/slides/slide4.xml><?xml version="1.0" encoding="utf-8"?>
 <p:sld xmlns:a="http://schemas.openxmlformats.org/drawingml/2006/main" xmlns:r="http://schemas.openxmlformats.org/officeDocument/2006/relationships" xmlns:p="http://schemas.openxmlformats.org/presentationml/2006/main">
   <p:cSld>
     <p:spTree>
@@ -6882,7 +7076,7 @@
 </p:sld>
 </file>
 
-<file path=ppt/slides/slide4.xml><?xml version="1.0" encoding="utf-8"?>
+<file path=ppt/slides/slide5.xml><?xml version="1.0" encoding="utf-8"?>
 <p:sld xmlns:a="http://schemas.openxmlformats.org/drawingml/2006/main" xmlns:r="http://schemas.openxmlformats.org/officeDocument/2006/relationships" xmlns:p="http://schemas.openxmlformats.org/presentationml/2006/main">
   <p:cSld>
     <p:spTree>
@@ -6929,17 +7123,7 @@
                   </a:schemeClr>
                 </a:solidFill>
               </a:rPr>
-              <a:t>What </a:t>
-            </a:r>
-            <a:r>
-              <a:rPr lang="en-US" sz="3200" dirty="0" smtClean="0">
-                <a:solidFill>
-                  <a:schemeClr val="accent2">
-                    <a:lumMod val="75000"/>
-                  </a:schemeClr>
-                </a:solidFill>
-              </a:rPr>
-              <a:t>is it?</a:t>
+              <a:t>What is it?</a:t>
             </a:r>
             <a:endParaRPr lang="en-US" sz="3200" dirty="0">
               <a:solidFill>
@@ -7050,184 +7234,6 @@
 </p:sld>
 </file>
 
-<file path=ppt/slides/slide5.xml><?xml version="1.0" encoding="utf-8"?>
-<p:sld xmlns:a="http://schemas.openxmlformats.org/drawingml/2006/main" xmlns:r="http://schemas.openxmlformats.org/officeDocument/2006/relationships" xmlns:p="http://schemas.openxmlformats.org/presentationml/2006/main">
-  <p:cSld>
-    <p:spTree>
-      <p:nvGrpSpPr>
-        <p:cNvPr id="1" name=""/>
-        <p:cNvGrpSpPr/>
-        <p:nvPr/>
-      </p:nvGrpSpPr>
-      <p:grpSpPr>
-        <a:xfrm>
-          <a:off x="0" y="0"/>
-          <a:ext cx="0" cy="0"/>
-          <a:chOff x="0" y="0"/>
-          <a:chExt cx="0" cy="0"/>
-        </a:xfrm>
-      </p:grpSpPr>
-      <p:sp>
-        <p:nvSpPr>
-          <p:cNvPr id="2" name="Title 1"/>
-          <p:cNvSpPr>
-            <a:spLocks noGrp="1"/>
-          </p:cNvSpPr>
-          <p:nvPr>
-            <p:ph type="title"/>
-          </p:nvPr>
-        </p:nvSpPr>
-        <p:spPr>
-          <a:xfrm>
-            <a:off x="677334" y="337819"/>
-            <a:ext cx="5015012" cy="659710"/>
-          </a:xfrm>
-        </p:spPr>
-        <p:txBody>
-          <a:bodyPr>
-            <a:normAutofit/>
-          </a:bodyPr>
-          <a:lstStyle/>
-          <a:p>
-            <a:r>
-              <a:rPr lang="en-US" sz="3200" dirty="0" smtClean="0">
-                <a:solidFill>
-                  <a:schemeClr val="accent2">
-                    <a:lumMod val="75000"/>
-                  </a:schemeClr>
-                </a:solidFill>
-              </a:rPr>
-              <a:t>How do you get infected</a:t>
-            </a:r>
-            <a:r>
-              <a:rPr lang="en-US" sz="3200" dirty="0" smtClean="0">
-                <a:solidFill>
-                  <a:schemeClr val="accent2">
-                    <a:lumMod val="75000"/>
-                  </a:schemeClr>
-                </a:solidFill>
-              </a:rPr>
-              <a:t>?</a:t>
-            </a:r>
-            <a:endParaRPr lang="en-US" sz="3200" dirty="0">
-              <a:solidFill>
-                <a:schemeClr val="accent2">
-                  <a:lumMod val="75000"/>
-                </a:schemeClr>
-              </a:solidFill>
-            </a:endParaRPr>
-          </a:p>
-        </p:txBody>
-      </p:sp>
-      <p:sp>
-        <p:nvSpPr>
-          <p:cNvPr id="4" name="Text Placeholder 3"/>
-          <p:cNvSpPr>
-            <a:spLocks noGrp="1"/>
-          </p:cNvSpPr>
-          <p:nvPr>
-            <p:ph type="body" sz="half" idx="2"/>
-          </p:nvPr>
-        </p:nvSpPr>
-        <p:spPr>
-          <a:xfrm>
-            <a:off x="677334" y="1138266"/>
-            <a:ext cx="5910502" cy="1703647"/>
-          </a:xfrm>
-        </p:spPr>
-        <p:txBody>
-          <a:bodyPr>
-            <a:normAutofit/>
-          </a:bodyPr>
-          <a:lstStyle/>
-          <a:p>
-            <a:r>
-              <a:rPr lang="en-US" sz="2400" b="1" dirty="0" smtClean="0">
-                <a:solidFill>
-                  <a:schemeClr val="accent2">
-                    <a:lumMod val="75000"/>
-                  </a:schemeClr>
-                </a:solidFill>
-              </a:rPr>
-              <a:t>Phishing</a:t>
-            </a:r>
-          </a:p>
-          <a:p>
-            <a:pPr marL="285750" indent="-285750">
-              <a:buFont typeface="Arial" panose="020B0604020202020204" pitchFamily="34" charset="0"/>
-              <a:buChar char="•"/>
-            </a:pPr>
-            <a:r>
-              <a:rPr lang="en-US" sz="1800" dirty="0" smtClean="0"/>
-              <a:t>Attracts targets through email propositions</a:t>
-            </a:r>
-          </a:p>
-          <a:p>
-            <a:pPr marL="285750" indent="-285750">
-              <a:buFont typeface="Arial" panose="020B0604020202020204" pitchFamily="34" charset="0"/>
-              <a:buChar char="•"/>
-            </a:pPr>
-            <a:r>
-              <a:rPr lang="en-US" sz="1800" dirty="0" smtClean="0"/>
-              <a:t>Program disguised as document but really is a .SCR </a:t>
-            </a:r>
-          </a:p>
-          <a:p>
-            <a:pPr marL="285750" indent="-285750">
-              <a:buFont typeface="Arial" panose="020B0604020202020204" pitchFamily="34" charset="0"/>
-              <a:buChar char="•"/>
-            </a:pPr>
-            <a:r>
-              <a:rPr lang="en-US" sz="1800" dirty="0" smtClean="0"/>
-              <a:t>Compromises data after launching it</a:t>
-            </a:r>
-            <a:endParaRPr lang="en-US" sz="1800" dirty="0"/>
-          </a:p>
-        </p:txBody>
-      </p:sp>
-      <p:pic>
-        <p:nvPicPr>
-          <p:cNvPr id="6" name="Picture 5"/>
-          <p:cNvPicPr>
-            <a:picLocks noChangeAspect="1"/>
-          </p:cNvPicPr>
-          <p:nvPr/>
-        </p:nvPicPr>
-        <p:blipFill>
-          <a:blip r:embed="rId2" cstate="print">
-            <a:extLst>
-              <a:ext uri="{28A0092B-C50C-407E-A947-70E740481C1C}">
-                <a14:useLocalDpi xmlns:a14="http://schemas.microsoft.com/office/drawing/2010/main" val="0"/>
-              </a:ext>
-            </a:extLst>
-          </a:blip>
-          <a:stretch>
-            <a:fillRect/>
-          </a:stretch>
-        </p:blipFill>
-        <p:spPr>
-          <a:xfrm>
-            <a:off x="2493818" y="2982651"/>
-            <a:ext cx="5359643" cy="3761048"/>
-          </a:xfrm>
-          <a:prstGeom prst="rect">
-            <a:avLst/>
-          </a:prstGeom>
-        </p:spPr>
-      </p:pic>
-    </p:spTree>
-    <p:extLst>
-      <p:ext uri="{BB962C8B-B14F-4D97-AF65-F5344CB8AC3E}">
-        <p14:creationId xmlns:p14="http://schemas.microsoft.com/office/powerpoint/2010/main" val="1825227377"/>
-      </p:ext>
-    </p:extLst>
-  </p:cSld>
-  <p:clrMapOvr>
-    <a:masterClrMapping/>
-  </p:clrMapOvr>
-</p:sld>
-</file>
-
 <file path=ppt/slides/slide6.xml><?xml version="1.0" encoding="utf-8"?>
 <p:sld xmlns:a="http://schemas.openxmlformats.org/drawingml/2006/main" xmlns:r="http://schemas.openxmlformats.org/officeDocument/2006/relationships" xmlns:p="http://schemas.openxmlformats.org/presentationml/2006/main">
   <p:cSld>
@@ -7282,13 +7288,6 @@
               </a:rPr>
               <a:t>Anti-analysis Code</a:t>
             </a:r>
-            <a:endParaRPr lang="en-US" sz="3200" b="1" dirty="0" smtClean="0">
-              <a:solidFill>
-                <a:schemeClr val="accent2">
-                  <a:lumMod val="75000"/>
-                </a:schemeClr>
-              </a:solidFill>
-            </a:endParaRPr>
           </a:p>
           <a:p>
             <a:pPr marL="285750" indent="-285750">
@@ -7589,7 +7588,6 @@
               <a:rPr lang="en-US" sz="2000" dirty="0" smtClean="0"/>
               <a:t>Executes yfoye.exe to unpack itself</a:t>
             </a:r>
-            <a:endParaRPr lang="en-US" sz="2000" dirty="0" smtClean="0"/>
           </a:p>
           <a:p>
             <a:pPr marL="285750" indent="-285750">
@@ -7601,13 +7599,8 @@
             </a:pPr>
             <a:r>
               <a:rPr lang="en-US" sz="2000" dirty="0" smtClean="0"/>
-              <a:t>Unpacked code overwrites </a:t>
-            </a:r>
-            <a:r>
-              <a:rPr lang="en-US" sz="2000" dirty="0" smtClean="0"/>
-              <a:t>previous code in memory</a:t>
-            </a:r>
-            <a:endParaRPr lang="en-US" sz="2000" dirty="0" smtClean="0"/>
+              <a:t>Unpacked code overwrites previous code in memory</a:t>
+            </a:r>
           </a:p>
           <a:p>
             <a:pPr>
@@ -7643,21 +7636,8 @@
             </a:pPr>
             <a:r>
               <a:rPr lang="en-US" sz="2400" dirty="0" smtClean="0"/>
-              <a:t>Unpacking </a:t>
-            </a:r>
-            <a:r>
-              <a:rPr lang="en-US" sz="2400" dirty="0" smtClean="0"/>
-              <a:t>process is </a:t>
-            </a:r>
-            <a:r>
-              <a:rPr lang="en-US" sz="2400" dirty="0" smtClean="0"/>
-              <a:t>much larger than Anti-analysis </a:t>
-            </a:r>
-            <a:r>
-              <a:rPr lang="en-US" sz="2400" dirty="0" smtClean="0"/>
-              <a:t>process for more complexity</a:t>
-            </a:r>
-            <a:endParaRPr lang="en-US" sz="2400" dirty="0" smtClean="0"/>
+              <a:t>Unpacking process is much larger than Anti-analysis process for more complexity</a:t>
+            </a:r>
           </a:p>
           <a:p>
             <a:pPr marL="285750" indent="-285750">

</xml_diff>